<commit_message>
Aggiunta prima versione modello di dominio
</commit_message>
<xml_diff>
--- a/Progetto/Presentazione.pptx
+++ b/Progetto/Presentazione.pptx
@@ -230,7 +230,7 @@
           <a:p>
             <a:fld id="{B65E5A98-DA83-404B-AF61-44AE5342FB50}" type="datetimeFigureOut">
               <a:rPr lang="it-IT" smtClean="0"/>
-              <a:t>01/11/2022</a:t>
+              <a:t>04/11/2022</a:t>
             </a:fld>
             <a:endParaRPr lang="it-IT"/>
           </a:p>
@@ -644,7 +644,7 @@
           <a:p>
             <a:fld id="{9CD29C0B-695A-4D66-B8E9-5671F929A42B}" type="datetime1">
               <a:rPr lang="it-IT" smtClean="0"/>
-              <a:t>01/11/2022</a:t>
+              <a:t>04/11/2022</a:t>
             </a:fld>
             <a:endParaRPr lang="it-IT"/>
           </a:p>
@@ -842,7 +842,7 @@
           <a:p>
             <a:fld id="{AF0EC3E5-863F-4DFB-B3BC-1B55C7011BF9}" type="datetime1">
               <a:rPr lang="it-IT" smtClean="0"/>
-              <a:t>01/11/2022</a:t>
+              <a:t>04/11/2022</a:t>
             </a:fld>
             <a:endParaRPr lang="it-IT"/>
           </a:p>
@@ -1050,7 +1050,7 @@
           <a:p>
             <a:fld id="{DE4D602C-F8B6-42E8-BED7-016CDA0017F3}" type="datetime1">
               <a:rPr lang="it-IT" smtClean="0"/>
-              <a:t>01/11/2022</a:t>
+              <a:t>04/11/2022</a:t>
             </a:fld>
             <a:endParaRPr lang="it-IT"/>
           </a:p>
@@ -1248,7 +1248,7 @@
           <a:p>
             <a:fld id="{EDB10CE1-110C-4ED2-B55F-A302E1FD9F70}" type="datetime1">
               <a:rPr lang="it-IT" smtClean="0"/>
-              <a:t>01/11/2022</a:t>
+              <a:t>04/11/2022</a:t>
             </a:fld>
             <a:endParaRPr lang="it-IT"/>
           </a:p>
@@ -1523,7 +1523,7 @@
           <a:p>
             <a:fld id="{0F61B4B8-A1B7-42D4-A1E0-2645EDAC8BED}" type="datetime1">
               <a:rPr lang="it-IT" smtClean="0"/>
-              <a:t>01/11/2022</a:t>
+              <a:t>04/11/2022</a:t>
             </a:fld>
             <a:endParaRPr lang="it-IT"/>
           </a:p>
@@ -1788,7 +1788,7 @@
           <a:p>
             <a:fld id="{188DF4B9-859A-4780-A169-ED3A8349339B}" type="datetime1">
               <a:rPr lang="it-IT" smtClean="0"/>
-              <a:t>01/11/2022</a:t>
+              <a:t>04/11/2022</a:t>
             </a:fld>
             <a:endParaRPr lang="it-IT"/>
           </a:p>
@@ -2200,7 +2200,7 @@
           <a:p>
             <a:fld id="{24D45E2C-55DD-40A9-BF2D-48E7D2AB1ABA}" type="datetime1">
               <a:rPr lang="it-IT" smtClean="0"/>
-              <a:t>01/11/2022</a:t>
+              <a:t>04/11/2022</a:t>
             </a:fld>
             <a:endParaRPr lang="it-IT"/>
           </a:p>
@@ -2341,7 +2341,7 @@
           <a:p>
             <a:fld id="{DC20DFAC-47A9-47B0-8C05-A3316EEF3D0C}" type="datetime1">
               <a:rPr lang="it-IT" smtClean="0"/>
-              <a:t>01/11/2022</a:t>
+              <a:t>04/11/2022</a:t>
             </a:fld>
             <a:endParaRPr lang="it-IT"/>
           </a:p>
@@ -2454,7 +2454,7 @@
           <a:p>
             <a:fld id="{B48A923B-8423-475F-9DB1-11B37109C533}" type="datetime1">
               <a:rPr lang="it-IT" smtClean="0"/>
-              <a:t>01/11/2022</a:t>
+              <a:t>04/11/2022</a:t>
             </a:fld>
             <a:endParaRPr lang="it-IT"/>
           </a:p>
@@ -2765,7 +2765,7 @@
           <a:p>
             <a:fld id="{39A5E392-1A82-4114-9B1C-7507E099813A}" type="datetime1">
               <a:rPr lang="it-IT" smtClean="0"/>
-              <a:t>01/11/2022</a:t>
+              <a:t>04/11/2022</a:t>
             </a:fld>
             <a:endParaRPr lang="it-IT"/>
           </a:p>
@@ -3053,7 +3053,7 @@
           <a:p>
             <a:fld id="{3F1E08A9-9033-4FA7-A83A-B5FC89FF2B18}" type="datetime1">
               <a:rPr lang="it-IT" smtClean="0"/>
-              <a:t>01/11/2022</a:t>
+              <a:t>04/11/2022</a:t>
             </a:fld>
             <a:endParaRPr lang="it-IT"/>
           </a:p>
@@ -3294,7 +3294,7 @@
           <a:p>
             <a:fld id="{62F13085-FB8A-48A6-9A18-D32F849A60AC}" type="datetime1">
               <a:rPr lang="it-IT" smtClean="0"/>
-              <a:t>01/11/2022</a:t>
+              <a:t>04/11/2022</a:t>
             </a:fld>
             <a:endParaRPr lang="it-IT"/>
           </a:p>
@@ -4684,7 +4684,7 @@
         <p:spPr>
           <a:xfrm>
             <a:off x="1066800" y="2428726"/>
-            <a:ext cx="10058400" cy="2677656"/>
+            <a:ext cx="10058400" cy="3046988"/>
           </a:xfrm>
           <a:prstGeom prst="rect">
             <a:avLst/>
@@ -4882,6 +4882,134 @@
                 </a:solidFill>
               </a:rPr>
               <a:t>anziano</a:t>
+            </a:r>
+            <a:r>
+              <a:rPr lang="en-US" sz="2400" dirty="0">
+                <a:solidFill>
+                  <a:srgbClr val="002060"/>
+                </a:solidFill>
+              </a:rPr>
+              <a:t>, </a:t>
+            </a:r>
+            <a:r>
+              <a:rPr lang="en-US" sz="2400" dirty="0" err="1">
+                <a:solidFill>
+                  <a:srgbClr val="002060"/>
+                </a:solidFill>
+              </a:rPr>
+              <a:t>quindi</a:t>
+            </a:r>
+            <a:r>
+              <a:rPr lang="en-US" sz="2400" dirty="0">
+                <a:solidFill>
+                  <a:srgbClr val="002060"/>
+                </a:solidFill>
+              </a:rPr>
+              <a:t> </a:t>
+            </a:r>
+            <a:r>
+              <a:rPr lang="en-US" sz="2400" dirty="0" err="1">
+                <a:solidFill>
+                  <a:srgbClr val="002060"/>
+                </a:solidFill>
+              </a:rPr>
+              <a:t>esiste</a:t>
+            </a:r>
+            <a:r>
+              <a:rPr lang="en-US" sz="2400" dirty="0">
+                <a:solidFill>
+                  <a:srgbClr val="002060"/>
+                </a:solidFill>
+              </a:rPr>
+              <a:t> una </a:t>
+            </a:r>
+            <a:r>
+              <a:rPr lang="en-US" sz="2400" dirty="0" err="1">
+                <a:solidFill>
+                  <a:srgbClr val="002060"/>
+                </a:solidFill>
+              </a:rPr>
+              <a:t>corrispondenza</a:t>
+            </a:r>
+            <a:r>
+              <a:rPr lang="en-US" sz="2400" dirty="0">
+                <a:solidFill>
+                  <a:srgbClr val="002060"/>
+                </a:solidFill>
+              </a:rPr>
+              <a:t> </a:t>
+            </a:r>
+            <a:r>
+              <a:rPr lang="en-US" sz="2400" dirty="0" err="1">
+                <a:solidFill>
+                  <a:srgbClr val="002060"/>
+                </a:solidFill>
+              </a:rPr>
+              <a:t>uno</a:t>
+            </a:r>
+            <a:r>
+              <a:rPr lang="en-US" sz="2400" dirty="0">
+                <a:solidFill>
+                  <a:srgbClr val="002060"/>
+                </a:solidFill>
+              </a:rPr>
+              <a:t> ad </a:t>
+            </a:r>
+            <a:r>
+              <a:rPr lang="en-US" sz="2400" dirty="0" err="1">
+                <a:solidFill>
+                  <a:srgbClr val="002060"/>
+                </a:solidFill>
+              </a:rPr>
+              <a:t>uno</a:t>
+            </a:r>
+            <a:r>
+              <a:rPr lang="en-US" sz="2400" dirty="0">
+                <a:solidFill>
+                  <a:srgbClr val="002060"/>
+                </a:solidFill>
+              </a:rPr>
+              <a:t> </a:t>
+            </a:r>
+            <a:r>
+              <a:rPr lang="en-US" sz="2400" dirty="0" err="1">
+                <a:solidFill>
+                  <a:srgbClr val="002060"/>
+                </a:solidFill>
+              </a:rPr>
+              <a:t>tra</a:t>
+            </a:r>
+            <a:r>
+              <a:rPr lang="en-US" sz="2400" dirty="0">
+                <a:solidFill>
+                  <a:srgbClr val="002060"/>
+                </a:solidFill>
+              </a:rPr>
+              <a:t> </a:t>
+            </a:r>
+            <a:r>
+              <a:rPr lang="en-US" sz="2400" dirty="0" err="1">
+                <a:solidFill>
+                  <a:srgbClr val="002060"/>
+                </a:solidFill>
+              </a:rPr>
+              <a:t>anziano</a:t>
+            </a:r>
+            <a:r>
+              <a:rPr lang="en-US" sz="2400" dirty="0">
+                <a:solidFill>
+                  <a:srgbClr val="002060"/>
+                </a:solidFill>
+              </a:rPr>
+              <a:t> e </a:t>
+            </a:r>
+            <a:r>
+              <a:rPr lang="en-US" sz="2400" dirty="0" err="1">
+                <a:solidFill>
+                  <a:srgbClr val="002060"/>
+                </a:solidFill>
+              </a:rPr>
+              <a:t>residenza</a:t>
             </a:r>
             <a:r>
               <a:rPr lang="en-US" sz="2400" dirty="0">
@@ -5969,7 +6097,7 @@
                   <a:srgbClr val="002060"/>
                 </a:solidFill>
               </a:rPr>
-              <a:t>istallato</a:t>
+              <a:t>installato</a:t>
             </a:r>
             <a:r>
               <a:rPr lang="en-US" sz="2400" dirty="0">

</xml_diff>

<commit_message>
Aggiornato modello di dominio, sistemato activity
</commit_message>
<xml_diff>
--- a/Progetto/Presentazione.pptx
+++ b/Progetto/Presentazione.pptx
@@ -230,7 +230,7 @@
           <a:p>
             <a:fld id="{B65E5A98-DA83-404B-AF61-44AE5342FB50}" type="datetimeFigureOut">
               <a:rPr lang="it-IT" smtClean="0"/>
-              <a:t>04/11/2022</a:t>
+              <a:t>11/11/2022</a:t>
             </a:fld>
             <a:endParaRPr lang="it-IT"/>
           </a:p>
@@ -644,7 +644,7 @@
           <a:p>
             <a:fld id="{9CD29C0B-695A-4D66-B8E9-5671F929A42B}" type="datetime1">
               <a:rPr lang="it-IT" smtClean="0"/>
-              <a:t>04/11/2022</a:t>
+              <a:t>11/11/2022</a:t>
             </a:fld>
             <a:endParaRPr lang="it-IT"/>
           </a:p>
@@ -842,7 +842,7 @@
           <a:p>
             <a:fld id="{AF0EC3E5-863F-4DFB-B3BC-1B55C7011BF9}" type="datetime1">
               <a:rPr lang="it-IT" smtClean="0"/>
-              <a:t>04/11/2022</a:t>
+              <a:t>11/11/2022</a:t>
             </a:fld>
             <a:endParaRPr lang="it-IT"/>
           </a:p>
@@ -1050,7 +1050,7 @@
           <a:p>
             <a:fld id="{DE4D602C-F8B6-42E8-BED7-016CDA0017F3}" type="datetime1">
               <a:rPr lang="it-IT" smtClean="0"/>
-              <a:t>04/11/2022</a:t>
+              <a:t>11/11/2022</a:t>
             </a:fld>
             <a:endParaRPr lang="it-IT"/>
           </a:p>
@@ -1248,7 +1248,7 @@
           <a:p>
             <a:fld id="{EDB10CE1-110C-4ED2-B55F-A302E1FD9F70}" type="datetime1">
               <a:rPr lang="it-IT" smtClean="0"/>
-              <a:t>04/11/2022</a:t>
+              <a:t>11/11/2022</a:t>
             </a:fld>
             <a:endParaRPr lang="it-IT"/>
           </a:p>
@@ -1523,7 +1523,7 @@
           <a:p>
             <a:fld id="{0F61B4B8-A1B7-42D4-A1E0-2645EDAC8BED}" type="datetime1">
               <a:rPr lang="it-IT" smtClean="0"/>
-              <a:t>04/11/2022</a:t>
+              <a:t>11/11/2022</a:t>
             </a:fld>
             <a:endParaRPr lang="it-IT"/>
           </a:p>
@@ -1788,7 +1788,7 @@
           <a:p>
             <a:fld id="{188DF4B9-859A-4780-A169-ED3A8349339B}" type="datetime1">
               <a:rPr lang="it-IT" smtClean="0"/>
-              <a:t>04/11/2022</a:t>
+              <a:t>11/11/2022</a:t>
             </a:fld>
             <a:endParaRPr lang="it-IT"/>
           </a:p>
@@ -2200,7 +2200,7 @@
           <a:p>
             <a:fld id="{24D45E2C-55DD-40A9-BF2D-48E7D2AB1ABA}" type="datetime1">
               <a:rPr lang="it-IT" smtClean="0"/>
-              <a:t>04/11/2022</a:t>
+              <a:t>11/11/2022</a:t>
             </a:fld>
             <a:endParaRPr lang="it-IT"/>
           </a:p>
@@ -2341,7 +2341,7 @@
           <a:p>
             <a:fld id="{DC20DFAC-47A9-47B0-8C05-A3316EEF3D0C}" type="datetime1">
               <a:rPr lang="it-IT" smtClean="0"/>
-              <a:t>04/11/2022</a:t>
+              <a:t>11/11/2022</a:t>
             </a:fld>
             <a:endParaRPr lang="it-IT"/>
           </a:p>
@@ -2454,7 +2454,7 @@
           <a:p>
             <a:fld id="{B48A923B-8423-475F-9DB1-11B37109C533}" type="datetime1">
               <a:rPr lang="it-IT" smtClean="0"/>
-              <a:t>04/11/2022</a:t>
+              <a:t>11/11/2022</a:t>
             </a:fld>
             <a:endParaRPr lang="it-IT"/>
           </a:p>
@@ -2765,7 +2765,7 @@
           <a:p>
             <a:fld id="{39A5E392-1A82-4114-9B1C-7507E099813A}" type="datetime1">
               <a:rPr lang="it-IT" smtClean="0"/>
-              <a:t>04/11/2022</a:t>
+              <a:t>11/11/2022</a:t>
             </a:fld>
             <a:endParaRPr lang="it-IT"/>
           </a:p>
@@ -3053,7 +3053,7 @@
           <a:p>
             <a:fld id="{3F1E08A9-9033-4FA7-A83A-B5FC89FF2B18}" type="datetime1">
               <a:rPr lang="it-IT" smtClean="0"/>
-              <a:t>04/11/2022</a:t>
+              <a:t>11/11/2022</a:t>
             </a:fld>
             <a:endParaRPr lang="it-IT"/>
           </a:p>
@@ -3294,7 +3294,7 @@
           <a:p>
             <a:fld id="{62F13085-FB8A-48A6-9A18-D32F849A60AC}" type="datetime1">
               <a:rPr lang="it-IT" smtClean="0"/>
-              <a:t>04/11/2022</a:t>
+              <a:t>11/11/2022</a:t>
             </a:fld>
             <a:endParaRPr lang="it-IT"/>
           </a:p>
@@ -5915,7 +5915,7 @@
                   <a:srgbClr val="002060"/>
                 </a:solidFill>
               </a:rPr>
-              <a:t>n</a:t>
+              <a:t>1</a:t>
             </a:r>
             <a:r>
               <a:rPr lang="en-US" sz="2400" dirty="0">
@@ -5931,63 +5931,31 @@
                   <a:srgbClr val="002060"/>
                 </a:solidFill>
               </a:rPr>
-              <a:t>controlli</a:t>
-            </a:r>
-            <a:r>
-              <a:rPr lang="en-US" sz="2400" dirty="0">
-                <a:solidFill>
-                  <a:srgbClr val="002060"/>
-                </a:solidFill>
-              </a:rPr>
-              <a:t> </a:t>
-            </a:r>
-            <a:r>
-              <a:rPr lang="en-US" sz="2400" dirty="0" err="1">
-                <a:solidFill>
-                  <a:srgbClr val="002060"/>
-                </a:solidFill>
-              </a:rPr>
-              <a:t>ogni</a:t>
-            </a:r>
-            <a:r>
-              <a:rPr lang="en-US" sz="2400" dirty="0">
-                <a:solidFill>
-                  <a:srgbClr val="002060"/>
-                </a:solidFill>
-              </a:rPr>
-              <a:t> </a:t>
-            </a:r>
-            <a:r>
-              <a:rPr lang="en-US" sz="2400" b="1" i="1" dirty="0">
-                <a:solidFill>
-                  <a:srgbClr val="002060"/>
-                </a:solidFill>
-              </a:rPr>
-              <a:t>m</a:t>
-            </a:r>
-            <a:r>
-              <a:rPr lang="en-US" sz="2400" dirty="0">
-                <a:solidFill>
-                  <a:srgbClr val="002060"/>
-                </a:solidFill>
-              </a:rPr>
-              <a:t> </a:t>
-            </a:r>
-            <a:r>
-              <a:rPr lang="en-US" sz="2400" dirty="0" err="1">
-                <a:solidFill>
-                  <a:srgbClr val="002060"/>
-                </a:solidFill>
-              </a:rPr>
-              <a:t>minuti</a:t>
-            </a:r>
-            <a:r>
-              <a:rPr lang="en-US" sz="2400" dirty="0">
-                <a:solidFill>
-                  <a:srgbClr val="002060"/>
-                </a:solidFill>
-              </a:rPr>
-              <a:t>;</a:t>
+              <a:t>controllo</a:t>
+            </a:r>
+            <a:r>
+              <a:rPr lang="en-US" sz="2400" dirty="0">
+                <a:solidFill>
+                  <a:srgbClr val="002060"/>
+                </a:solidFill>
+              </a:rPr>
+              <a:t> al secondo (60 al </a:t>
+            </a:r>
+            <a:r>
+              <a:rPr lang="en-US" sz="2400" dirty="0" err="1">
+                <a:solidFill>
+                  <a:srgbClr val="002060"/>
+                </a:solidFill>
+              </a:rPr>
+              <a:t>minuto</a:t>
+            </a:r>
+            <a:r>
+              <a:rPr lang="en-US" sz="2400" dirty="0">
+                <a:solidFill>
+                  <a:srgbClr val="002060"/>
+                </a:solidFill>
+              </a:rPr>
+              <a:t>);</a:t>
             </a:r>
           </a:p>
           <a:p>

</xml_diff>